<commit_message>
new Update for seminar
</commit_message>
<xml_diff>
--- a/Seminar/Rule-Based Runtime Verification Tool.pptx
+++ b/Seminar/Rule-Based Runtime Verification Tool.pptx
@@ -6,7 +6,7 @@
     <p:sldMasterId id="2147483660" r:id="rId2"/>
   </p:sldMasterIdLst>
   <p:notesMasterIdLst>
-    <p:notesMasterId r:id="rId15"/>
+    <p:notesMasterId r:id="rId16"/>
   </p:notesMasterIdLst>
   <p:sldIdLst>
     <p:sldId id="256" r:id="rId3"/>
@@ -17,10 +17,11 @@
     <p:sldId id="267" r:id="rId8"/>
     <p:sldId id="268" r:id="rId9"/>
     <p:sldId id="262" r:id="rId10"/>
-    <p:sldId id="260" r:id="rId11"/>
-    <p:sldId id="261" r:id="rId12"/>
-    <p:sldId id="263" r:id="rId13"/>
-    <p:sldId id="264" r:id="rId14"/>
+    <p:sldId id="269" r:id="rId11"/>
+    <p:sldId id="260" r:id="rId12"/>
+    <p:sldId id="261" r:id="rId13"/>
+    <p:sldId id="263" r:id="rId14"/>
+    <p:sldId id="264" r:id="rId15"/>
   </p:sldIdLst>
   <p:sldSz cx="12192000" cy="6858000"/>
   <p:notesSz cx="6858000" cy="9144000"/>
@@ -221,7 +222,7 @@
           <a:p>
             <a:fld id="{A0C6D5AA-3C35-4905-9DFE-AD97A8218592}" type="datetimeFigureOut">
               <a:rPr lang="en-GB" smtClean="0"/>
-              <a:t>09/11/2016</a:t>
+              <a:t>10/11/2016</a:t>
             </a:fld>
             <a:endParaRPr lang="en-GB"/>
           </a:p>
@@ -1148,6 +1149,294 @@
 </p:notes>
 </file>
 
+<file path=ppt/notesSlides/notesSlide5.xml><?xml version="1.0" encoding="utf-8"?>
+<p:notes xmlns:a="http://schemas.openxmlformats.org/drawingml/2006/main" xmlns:r="http://schemas.openxmlformats.org/officeDocument/2006/relationships" xmlns:p="http://schemas.openxmlformats.org/presentationml/2006/main">
+  <p:cSld>
+    <p:spTree>
+      <p:nvGrpSpPr>
+        <p:cNvPr id="1" name=""/>
+        <p:cNvGrpSpPr/>
+        <p:nvPr/>
+      </p:nvGrpSpPr>
+      <p:grpSpPr>
+        <a:xfrm>
+          <a:off x="0" y="0"/>
+          <a:ext cx="0" cy="0"/>
+          <a:chOff x="0" y="0"/>
+          <a:chExt cx="0" cy="0"/>
+        </a:xfrm>
+      </p:grpSpPr>
+      <p:sp>
+        <p:nvSpPr>
+          <p:cNvPr id="2" name="Slide Image Placeholder 1"/>
+          <p:cNvSpPr>
+            <a:spLocks noGrp="1" noRot="1" noChangeAspect="1"/>
+          </p:cNvSpPr>
+          <p:nvPr>
+            <p:ph type="sldImg"/>
+          </p:nvPr>
+        </p:nvSpPr>
+        <p:spPr/>
+      </p:sp>
+      <p:sp>
+        <p:nvSpPr>
+          <p:cNvPr id="3" name="Notes Placeholder 2"/>
+          <p:cNvSpPr>
+            <a:spLocks noGrp="1"/>
+          </p:cNvSpPr>
+          <p:nvPr>
+            <p:ph type="body" idx="1"/>
+          </p:nvPr>
+        </p:nvSpPr>
+        <p:spPr/>
+        <p:txBody>
+          <a:bodyPr/>
+          <a:lstStyle/>
+          <a:p>
+            <a:endParaRPr lang="en-GB" dirty="0"/>
+          </a:p>
+        </p:txBody>
+      </p:sp>
+      <p:sp>
+        <p:nvSpPr>
+          <p:cNvPr id="4" name="Slide Number Placeholder 3"/>
+          <p:cNvSpPr>
+            <a:spLocks noGrp="1"/>
+          </p:cNvSpPr>
+          <p:nvPr>
+            <p:ph type="sldNum" sz="quarter" idx="10"/>
+          </p:nvPr>
+        </p:nvSpPr>
+        <p:spPr/>
+        <p:txBody>
+          <a:bodyPr/>
+          <a:lstStyle/>
+          <a:p>
+            <a:fld id="{23428444-63B1-4301-AC3C-CE9B26C204F0}" type="slidenum">
+              <a:rPr lang="en-GB" smtClean="0"/>
+              <a:t>7</a:t>
+            </a:fld>
+            <a:endParaRPr lang="en-GB"/>
+          </a:p>
+        </p:txBody>
+      </p:sp>
+    </p:spTree>
+    <p:extLst>
+      <p:ext uri="{BB962C8B-B14F-4D97-AF65-F5344CB8AC3E}">
+        <p14:creationId xmlns:p14="http://schemas.microsoft.com/office/powerpoint/2010/main" val="3792755588"/>
+      </p:ext>
+    </p:extLst>
+  </p:cSld>
+  <p:clrMapOvr>
+    <a:masterClrMapping/>
+  </p:clrMapOvr>
+</p:notes>
+</file>
+
+<file path=ppt/notesSlides/notesSlide6.xml><?xml version="1.0" encoding="utf-8"?>
+<p:notes xmlns:a="http://schemas.openxmlformats.org/drawingml/2006/main" xmlns:r="http://schemas.openxmlformats.org/officeDocument/2006/relationships" xmlns:p="http://schemas.openxmlformats.org/presentationml/2006/main">
+  <p:cSld>
+    <p:spTree>
+      <p:nvGrpSpPr>
+        <p:cNvPr id="1" name=""/>
+        <p:cNvGrpSpPr/>
+        <p:nvPr/>
+      </p:nvGrpSpPr>
+      <p:grpSpPr>
+        <a:xfrm>
+          <a:off x="0" y="0"/>
+          <a:ext cx="0" cy="0"/>
+          <a:chOff x="0" y="0"/>
+          <a:chExt cx="0" cy="0"/>
+        </a:xfrm>
+      </p:grpSpPr>
+      <p:sp>
+        <p:nvSpPr>
+          <p:cNvPr id="2" name="Slide Image Placeholder 1"/>
+          <p:cNvSpPr>
+            <a:spLocks noGrp="1" noRot="1" noChangeAspect="1"/>
+          </p:cNvSpPr>
+          <p:nvPr>
+            <p:ph type="sldImg"/>
+          </p:nvPr>
+        </p:nvSpPr>
+        <p:spPr/>
+      </p:sp>
+      <p:sp>
+        <p:nvSpPr>
+          <p:cNvPr id="3" name="Notes Placeholder 2"/>
+          <p:cNvSpPr>
+            <a:spLocks noGrp="1"/>
+          </p:cNvSpPr>
+          <p:nvPr>
+            <p:ph type="body" idx="1"/>
+          </p:nvPr>
+        </p:nvSpPr>
+        <p:spPr/>
+        <p:txBody>
+          <a:bodyPr/>
+          <a:lstStyle/>
+          <a:p>
+            <a:r>
+              <a:rPr lang="en-GB" sz="1200" b="1" kern="1200" dirty="0" smtClean="0">
+                <a:solidFill>
+                  <a:schemeClr val="tx1"/>
+                </a:solidFill>
+                <a:effectLst/>
+                <a:latin typeface="+mn-lt"/>
+                <a:ea typeface="+mn-ea"/>
+                <a:cs typeface="+mn-cs"/>
+              </a:rPr>
+              <a:t>Interfacing with the outside world.</a:t>
+            </a:r>
+            <a:r>
+              <a:rPr lang="en-GB" sz="1200" kern="1200" dirty="0" smtClean="0">
+                <a:solidFill>
+                  <a:schemeClr val="tx1"/>
+                </a:solidFill>
+                <a:effectLst/>
+                <a:latin typeface="+mn-lt"/>
+                <a:ea typeface="+mn-ea"/>
+                <a:cs typeface="+mn-cs"/>
+              </a:rPr>
+              <a:t> A monitoring tool needs to take as input both a specification and some observations about a monitored system. For the specification it needs to provide usable parsing for </a:t>
+            </a:r>
+            <a:r>
+              <a:rPr lang="en-GB" sz="1200" kern="1200" dirty="0" err="1" smtClean="0">
+                <a:solidFill>
+                  <a:schemeClr val="tx1"/>
+                </a:solidFill>
+                <a:effectLst/>
+                <a:latin typeface="+mn-lt"/>
+                <a:ea typeface="+mn-ea"/>
+                <a:cs typeface="+mn-cs"/>
+              </a:rPr>
+              <a:t>RuleR</a:t>
+            </a:r>
+            <a:r>
+              <a:rPr lang="en-GB" sz="1200" kern="1200" dirty="0" smtClean="0">
+                <a:solidFill>
+                  <a:schemeClr val="tx1"/>
+                </a:solidFill>
+                <a:effectLst/>
+                <a:latin typeface="+mn-lt"/>
+                <a:ea typeface="+mn-ea"/>
+                <a:cs typeface="+mn-cs"/>
+              </a:rPr>
+              <a:t> specifications. For the observations it will need to interface with instrumentation techniques (such as AspectJ) and parse log files for offline monitoring. </a:t>
+            </a:r>
+            <a:r>
+              <a:rPr lang="en-GB" sz="1200" b="1" kern="1200" dirty="0" smtClean="0">
+                <a:solidFill>
+                  <a:schemeClr val="tx1"/>
+                </a:solidFill>
+                <a:effectLst/>
+                <a:latin typeface="+mn-lt"/>
+                <a:ea typeface="+mn-ea"/>
+                <a:cs typeface="+mn-cs"/>
+              </a:rPr>
+              <a:t>Making it go fast. </a:t>
+            </a:r>
+            <a:r>
+              <a:rPr lang="en-GB" sz="1200" kern="1200" dirty="0" smtClean="0">
+                <a:solidFill>
+                  <a:schemeClr val="tx1"/>
+                </a:solidFill>
+                <a:effectLst/>
+                <a:latin typeface="+mn-lt"/>
+                <a:ea typeface="+mn-ea"/>
+                <a:cs typeface="+mn-cs"/>
+              </a:rPr>
+              <a:t>The algorithm needs to identify which rules to fire. Naively this can be implemented as a linear search but it is likely that more efficient indexing solutions exist. Additionally, the fact database can be stored in a simple set or list data structure, however this may also be non-optimal for traversal and fact deletion operations. There are then further possible optimisations related to garbage collection and other certain special cases that could be explored. </a:t>
+            </a:r>
+            <a:r>
+              <a:rPr lang="en-GB" sz="1200" b="1" kern="1200" dirty="0" smtClean="0">
+                <a:solidFill>
+                  <a:schemeClr val="tx1"/>
+                </a:solidFill>
+                <a:effectLst/>
+                <a:latin typeface="+mn-lt"/>
+                <a:ea typeface="+mn-ea"/>
+                <a:cs typeface="+mn-cs"/>
+              </a:rPr>
+              <a:t>Making it more powerful. </a:t>
+            </a:r>
+            <a:r>
+              <a:rPr lang="en-GB" sz="1200" kern="1200" dirty="0" smtClean="0">
+                <a:solidFill>
+                  <a:schemeClr val="tx1"/>
+                </a:solidFill>
+                <a:effectLst/>
+                <a:latin typeface="+mn-lt"/>
+                <a:ea typeface="+mn-ea"/>
+                <a:cs typeface="+mn-cs"/>
+              </a:rPr>
+              <a:t>There are possible extensions to the </a:t>
+            </a:r>
+            <a:r>
+              <a:rPr lang="en-GB" sz="1200" kern="1200" dirty="0" err="1" smtClean="0">
+                <a:solidFill>
+                  <a:schemeClr val="tx1"/>
+                </a:solidFill>
+                <a:effectLst/>
+                <a:latin typeface="+mn-lt"/>
+                <a:ea typeface="+mn-ea"/>
+                <a:cs typeface="+mn-cs"/>
+              </a:rPr>
+              <a:t>RuleR</a:t>
+            </a:r>
+            <a:r>
+              <a:rPr lang="en-GB" sz="1200" kern="1200" dirty="0" smtClean="0">
+                <a:solidFill>
+                  <a:schemeClr val="tx1"/>
+                </a:solidFill>
+                <a:effectLst/>
+                <a:latin typeface="+mn-lt"/>
+                <a:ea typeface="+mn-ea"/>
+                <a:cs typeface="+mn-cs"/>
+              </a:rPr>
+              <a:t> language that could be supported by extensions to the monitoring algorithm. For example, using arithmetic or data structures within rules. This part would look at the (theoretical) language extension and how to extend the monitoring algorithm.</a:t>
+            </a:r>
+            <a:endParaRPr lang="en-GB" dirty="0"/>
+          </a:p>
+        </p:txBody>
+      </p:sp>
+      <p:sp>
+        <p:nvSpPr>
+          <p:cNvPr id="4" name="Slide Number Placeholder 3"/>
+          <p:cNvSpPr>
+            <a:spLocks noGrp="1"/>
+          </p:cNvSpPr>
+          <p:nvPr>
+            <p:ph type="sldNum" sz="quarter" idx="10"/>
+          </p:nvPr>
+        </p:nvSpPr>
+        <p:spPr/>
+        <p:txBody>
+          <a:bodyPr/>
+          <a:lstStyle/>
+          <a:p>
+            <a:fld id="{23428444-63B1-4301-AC3C-CE9B26C204F0}" type="slidenum">
+              <a:rPr lang="en-GB" smtClean="0"/>
+              <a:t>11</a:t>
+            </a:fld>
+            <a:endParaRPr lang="en-GB"/>
+          </a:p>
+        </p:txBody>
+      </p:sp>
+    </p:spTree>
+    <p:extLst>
+      <p:ext uri="{BB962C8B-B14F-4D97-AF65-F5344CB8AC3E}">
+        <p14:creationId xmlns:p14="http://schemas.microsoft.com/office/powerpoint/2010/main" val="2303108785"/>
+      </p:ext>
+    </p:extLst>
+  </p:cSld>
+  <p:clrMapOvr>
+    <a:masterClrMapping/>
+  </p:clrMapOvr>
+</p:notes>
+</file>
+
 <file path=ppt/slideLayouts/slideLayout1.xml><?xml version="1.0" encoding="utf-8"?>
 <p:sldLayout xmlns:a="http://schemas.openxmlformats.org/drawingml/2006/main" xmlns:r="http://schemas.openxmlformats.org/officeDocument/2006/relationships" xmlns:p="http://schemas.openxmlformats.org/presentationml/2006/main" type="title" preserve="1">
   <p:cSld name="Title Slide">
@@ -1431,7 +1720,7 @@
           <a:p>
             <a:fld id="{0B9C70C9-9C08-412B-815E-173E5167EC12}" type="datetimeFigureOut">
               <a:rPr lang="en-GB" smtClean="0"/>
-              <a:t>09/11/2016</a:t>
+              <a:t>10/11/2016</a:t>
             </a:fld>
             <a:endParaRPr lang="en-GB"/>
           </a:p>
@@ -1627,7 +1916,7 @@
           <a:p>
             <a:fld id="{0B9C70C9-9C08-412B-815E-173E5167EC12}" type="datetimeFigureOut">
               <a:rPr lang="en-GB" smtClean="0"/>
-              <a:t>09/11/2016</a:t>
+              <a:t>10/11/2016</a:t>
             </a:fld>
             <a:endParaRPr lang="en-GB"/>
           </a:p>
@@ -2018,7 +2307,7 @@
           <a:p>
             <a:fld id="{0B9C70C9-9C08-412B-815E-173E5167EC12}" type="datetimeFigureOut">
               <a:rPr lang="en-GB" smtClean="0"/>
-              <a:t>09/11/2016</a:t>
+              <a:t>10/11/2016</a:t>
             </a:fld>
             <a:endParaRPr lang="en-GB"/>
           </a:p>
@@ -2287,7 +2576,7 @@
           <a:p>
             <a:fld id="{0B9C70C9-9C08-412B-815E-173E5167EC12}" type="datetimeFigureOut">
               <a:rPr lang="en-GB" smtClean="0"/>
-              <a:t>09/11/2016</a:t>
+              <a:t>10/11/2016</a:t>
             </a:fld>
             <a:endParaRPr lang="en-GB"/>
           </a:p>
@@ -2542,7 +2831,7 @@
           <a:p>
             <a:fld id="{0B9C70C9-9C08-412B-815E-173E5167EC12}" type="datetimeFigureOut">
               <a:rPr lang="en-GB" smtClean="0"/>
-              <a:t>09/11/2016</a:t>
+              <a:t>10/11/2016</a:t>
             </a:fld>
             <a:endParaRPr lang="en-GB"/>
           </a:p>
@@ -2932,7 +3221,7 @@
           <a:p>
             <a:fld id="{0B9C70C9-9C08-412B-815E-173E5167EC12}" type="datetimeFigureOut">
               <a:rPr lang="en-GB" smtClean="0"/>
-              <a:t>09/11/2016</a:t>
+              <a:t>10/11/2016</a:t>
             </a:fld>
             <a:endParaRPr lang="en-GB"/>
           </a:p>
@@ -3066,7 +3355,7 @@
           <a:p>
             <a:fld id="{0B9C70C9-9C08-412B-815E-173E5167EC12}" type="datetimeFigureOut">
               <a:rPr lang="en-GB" smtClean="0"/>
-              <a:t>09/11/2016</a:t>
+              <a:t>10/11/2016</a:t>
             </a:fld>
             <a:endParaRPr lang="en-GB"/>
           </a:p>
@@ -3177,7 +3466,7 @@
           <a:p>
             <a:fld id="{0B9C70C9-9C08-412B-815E-173E5167EC12}" type="datetimeFigureOut">
               <a:rPr lang="en-GB" smtClean="0"/>
-              <a:t>09/11/2016</a:t>
+              <a:t>10/11/2016</a:t>
             </a:fld>
             <a:endParaRPr lang="en-GB"/>
           </a:p>
@@ -3470,7 +3759,7 @@
           <a:p>
             <a:fld id="{0B9C70C9-9C08-412B-815E-173E5167EC12}" type="datetimeFigureOut">
               <a:rPr lang="en-GB" smtClean="0"/>
-              <a:t>09/11/2016</a:t>
+              <a:t>10/11/2016</a:t>
             </a:fld>
             <a:endParaRPr lang="en-GB"/>
           </a:p>
@@ -3688,7 +3977,7 @@
           <a:p>
             <a:fld id="{0B9C70C9-9C08-412B-815E-173E5167EC12}" type="datetimeFigureOut">
               <a:rPr lang="en-GB" smtClean="0"/>
-              <a:t>09/11/2016</a:t>
+              <a:t>10/11/2016</a:t>
             </a:fld>
             <a:endParaRPr lang="en-GB"/>
           </a:p>
@@ -3964,7 +4253,7 @@
           <a:p>
             <a:fld id="{0B9C70C9-9C08-412B-815E-173E5167EC12}" type="datetimeFigureOut">
               <a:rPr lang="en-GB" smtClean="0"/>
-              <a:t>09/11/2016</a:t>
+              <a:t>10/11/2016</a:t>
             </a:fld>
             <a:endParaRPr lang="en-GB"/>
           </a:p>
@@ -4150,7 +4439,7 @@
           <a:p>
             <a:fld id="{0B9C70C9-9C08-412B-815E-173E5167EC12}" type="datetimeFigureOut">
               <a:rPr lang="en-GB" smtClean="0"/>
-              <a:t>09/11/2016</a:t>
+              <a:t>10/11/2016</a:t>
             </a:fld>
             <a:endParaRPr lang="en-GB"/>
           </a:p>
@@ -4346,7 +4635,7 @@
           <a:p>
             <a:fld id="{0B9C70C9-9C08-412B-815E-173E5167EC12}" type="datetimeFigureOut">
               <a:rPr lang="en-GB" smtClean="0"/>
-              <a:t>09/11/2016</a:t>
+              <a:t>10/11/2016</a:t>
             </a:fld>
             <a:endParaRPr lang="en-GB"/>
           </a:p>
@@ -4615,7 +4904,7 @@
           <a:p>
             <a:fld id="{0B9C70C9-9C08-412B-815E-173E5167EC12}" type="datetimeFigureOut">
               <a:rPr lang="en-GB" smtClean="0"/>
-              <a:t>09/11/2016</a:t>
+              <a:t>10/11/2016</a:t>
             </a:fld>
             <a:endParaRPr lang="en-GB"/>
           </a:p>
@@ -4870,7 +5159,7 @@
           <a:p>
             <a:fld id="{0B9C70C9-9C08-412B-815E-173E5167EC12}" type="datetimeFigureOut">
               <a:rPr lang="en-GB" smtClean="0"/>
-              <a:t>09/11/2016</a:t>
+              <a:t>10/11/2016</a:t>
             </a:fld>
             <a:endParaRPr lang="en-GB"/>
           </a:p>
@@ -5260,7 +5549,7 @@
           <a:p>
             <a:fld id="{0B9C70C9-9C08-412B-815E-173E5167EC12}" type="datetimeFigureOut">
               <a:rPr lang="en-GB" smtClean="0"/>
-              <a:t>09/11/2016</a:t>
+              <a:t>10/11/2016</a:t>
             </a:fld>
             <a:endParaRPr lang="en-GB"/>
           </a:p>
@@ -5394,7 +5683,7 @@
           <a:p>
             <a:fld id="{0B9C70C9-9C08-412B-815E-173E5167EC12}" type="datetimeFigureOut">
               <a:rPr lang="en-GB" smtClean="0"/>
-              <a:t>09/11/2016</a:t>
+              <a:t>10/11/2016</a:t>
             </a:fld>
             <a:endParaRPr lang="en-GB"/>
           </a:p>
@@ -5505,7 +5794,7 @@
           <a:p>
             <a:fld id="{0B9C70C9-9C08-412B-815E-173E5167EC12}" type="datetimeFigureOut">
               <a:rPr lang="en-GB" smtClean="0"/>
-              <a:t>09/11/2016</a:t>
+              <a:t>10/11/2016</a:t>
             </a:fld>
             <a:endParaRPr lang="en-GB"/>
           </a:p>
@@ -5798,7 +6087,7 @@
           <a:p>
             <a:fld id="{0B9C70C9-9C08-412B-815E-173E5167EC12}" type="datetimeFigureOut">
               <a:rPr lang="en-GB" smtClean="0"/>
-              <a:t>09/11/2016</a:t>
+              <a:t>10/11/2016</a:t>
             </a:fld>
             <a:endParaRPr lang="en-GB"/>
           </a:p>
@@ -6067,7 +6356,7 @@
           <a:p>
             <a:fld id="{0B9C70C9-9C08-412B-815E-173E5167EC12}" type="datetimeFigureOut">
               <a:rPr lang="en-GB" smtClean="0"/>
-              <a:t>09/11/2016</a:t>
+              <a:t>10/11/2016</a:t>
             </a:fld>
             <a:endParaRPr lang="en-GB"/>
           </a:p>
@@ -7629,7 +7918,7 @@
           <a:p>
             <a:r>
               <a:rPr lang="en-GB" dirty="0" smtClean="0"/>
-              <a:t>Goal</a:t>
+              <a:t>Problems</a:t>
             </a:r>
             <a:endParaRPr lang="en-GB" dirty="0"/>
           </a:p>
@@ -7650,14 +7939,23 @@
           <a:bodyPr/>
           <a:lstStyle/>
           <a:p>
-            <a:endParaRPr lang="en-GB"/>
+            <a:r>
+              <a:rPr lang="en-GB" dirty="0" smtClean="0"/>
+              <a:t>Scalability </a:t>
+            </a:r>
+          </a:p>
+          <a:p>
+            <a:endParaRPr lang="en-GB" dirty="0"/>
+          </a:p>
+          <a:p>
+            <a:endParaRPr lang="en-GB" dirty="0"/>
           </a:p>
         </p:txBody>
       </p:sp>
     </p:spTree>
     <p:extLst>
       <p:ext uri="{BB962C8B-B14F-4D97-AF65-F5344CB8AC3E}">
-        <p14:creationId xmlns:p14="http://schemas.microsoft.com/office/powerpoint/2010/main" val="1407891076"/>
+        <p14:creationId xmlns:p14="http://schemas.microsoft.com/office/powerpoint/2010/main" val="430266955"/>
       </p:ext>
     </p:extLst>
   </p:cSld>
@@ -7708,7 +8006,7 @@
           <a:p>
             <a:r>
               <a:rPr lang="en-GB" dirty="0" smtClean="0"/>
-              <a:t>Plan</a:t>
+              <a:t>Goal</a:t>
             </a:r>
             <a:endParaRPr lang="en-GB" dirty="0"/>
           </a:p>
@@ -7726,17 +8024,49 @@
         </p:nvSpPr>
         <p:spPr/>
         <p:txBody>
-          <a:bodyPr/>
-          <a:lstStyle/>
-          <a:p>
-            <a:endParaRPr lang="en-GB"/>
+          <a:bodyPr>
+            <a:normAutofit/>
+          </a:bodyPr>
+          <a:lstStyle/>
+          <a:p>
+            <a:r>
+              <a:rPr lang="en-GB" dirty="0"/>
+              <a:t>Interfacing with the outside </a:t>
+            </a:r>
+            <a:r>
+              <a:rPr lang="en-GB" dirty="0" smtClean="0"/>
+              <a:t>world</a:t>
+            </a:r>
+          </a:p>
+          <a:p>
+            <a:endParaRPr lang="en-GB" dirty="0"/>
+          </a:p>
+          <a:p>
+            <a:r>
+              <a:rPr lang="en-GB" dirty="0"/>
+              <a:t>Making it go </a:t>
+            </a:r>
+            <a:r>
+              <a:rPr lang="en-GB" dirty="0" smtClean="0"/>
+              <a:t>fast</a:t>
+            </a:r>
+          </a:p>
+          <a:p>
+            <a:endParaRPr lang="en-GB" dirty="0"/>
+          </a:p>
+          <a:p>
+            <a:r>
+              <a:rPr lang="en-GB" dirty="0"/>
+              <a:t>Making it more powerful</a:t>
+            </a:r>
+            <a:endParaRPr lang="en-GB" dirty="0"/>
           </a:p>
         </p:txBody>
       </p:sp>
     </p:spTree>
     <p:extLst>
       <p:ext uri="{BB962C8B-B14F-4D97-AF65-F5344CB8AC3E}">
-        <p14:creationId xmlns:p14="http://schemas.microsoft.com/office/powerpoint/2010/main" val="2010262969"/>
+        <p14:creationId xmlns:p14="http://schemas.microsoft.com/office/powerpoint/2010/main" val="1407891076"/>
       </p:ext>
     </p:extLst>
   </p:cSld>
@@ -7770,6 +8100,99 @@
           <a:chExt cx="0" cy="0"/>
         </a:xfrm>
       </p:grpSpPr>
+      <p:pic>
+        <p:nvPicPr>
+          <p:cNvPr id="4" name="Content Placeholder 3"/>
+          <p:cNvPicPr>
+            <a:picLocks noGrp="1" noChangeAspect="1"/>
+          </p:cNvPicPr>
+          <p:nvPr>
+            <p:ph idx="4294967295"/>
+          </p:nvPr>
+        </p:nvPicPr>
+        <p:blipFill rotWithShape="1">
+          <a:blip r:embed="rId2">
+            <a:extLst>
+              <a:ext uri="{28A0092B-C50C-407E-A947-70E740481C1C}">
+                <a14:useLocalDpi xmlns:a14="http://schemas.microsoft.com/office/drawing/2010/main" val="0"/>
+              </a:ext>
+            </a:extLst>
+          </a:blip>
+          <a:srcRect l="1388" t="1425" r="416" b="438"/>
+          <a:stretch/>
+        </p:blipFill>
+        <p:spPr>
+          <a:xfrm>
+            <a:off x="520260" y="449263"/>
+            <a:ext cx="11147425" cy="6069012"/>
+          </a:xfrm>
+        </p:spPr>
+      </p:pic>
+      <p:sp>
+        <p:nvSpPr>
+          <p:cNvPr id="2" name="Title 1"/>
+          <p:cNvSpPr>
+            <a:spLocks noGrp="1"/>
+          </p:cNvSpPr>
+          <p:nvPr>
+            <p:ph type="title" idx="4294967295"/>
+          </p:nvPr>
+        </p:nvSpPr>
+        <p:spPr>
+          <a:xfrm>
+            <a:off x="551798" y="46038"/>
+            <a:ext cx="10515600" cy="804862"/>
+          </a:xfrm>
+        </p:spPr>
+        <p:txBody>
+          <a:bodyPr/>
+          <a:lstStyle/>
+          <a:p>
+            <a:r>
+              <a:rPr lang="en-GB" dirty="0" smtClean="0"/>
+              <a:t>Plan</a:t>
+            </a:r>
+            <a:endParaRPr lang="en-GB" dirty="0"/>
+          </a:p>
+        </p:txBody>
+      </p:sp>
+    </p:spTree>
+    <p:extLst>
+      <p:ext uri="{BB962C8B-B14F-4D97-AF65-F5344CB8AC3E}">
+        <p14:creationId xmlns:p14="http://schemas.microsoft.com/office/powerpoint/2010/main" val="2010262969"/>
+      </p:ext>
+    </p:extLst>
+  </p:cSld>
+  <p:clrMapOvr>
+    <a:masterClrMapping/>
+  </p:clrMapOvr>
+  <p:timing>
+    <p:tnLst>
+      <p:par>
+        <p:cTn id="1" dur="indefinite" restart="never" nodeType="tmRoot"/>
+      </p:par>
+    </p:tnLst>
+  </p:timing>
+</p:sld>
+</file>
+
+<file path=ppt/slides/slide13.xml><?xml version="1.0" encoding="utf-8"?>
+<p:sld xmlns:a="http://schemas.openxmlformats.org/drawingml/2006/main" xmlns:r="http://schemas.openxmlformats.org/officeDocument/2006/relationships" xmlns:p="http://schemas.openxmlformats.org/presentationml/2006/main">
+  <p:cSld>
+    <p:spTree>
+      <p:nvGrpSpPr>
+        <p:cNvPr id="1" name=""/>
+        <p:cNvGrpSpPr/>
+        <p:nvPr/>
+      </p:nvGrpSpPr>
+      <p:grpSpPr>
+        <a:xfrm>
+          <a:off x="0" y="0"/>
+          <a:ext cx="0" cy="0"/>
+          <a:chOff x="0" y="0"/>
+          <a:chExt cx="0" cy="0"/>
+        </a:xfrm>
+      </p:grpSpPr>
       <p:sp>
         <p:nvSpPr>
           <p:cNvPr id="2" name="Title 1"/>
@@ -7808,7 +8231,41 @@
           <a:bodyPr/>
           <a:lstStyle/>
           <a:p>
-            <a:endParaRPr lang="en-GB"/>
+            <a:r>
+              <a:rPr lang="en-GB" dirty="0"/>
+              <a:t>a</a:t>
+            </a:r>
+            <a:r>
+              <a:rPr lang="en-GB" dirty="0" smtClean="0"/>
+              <a:t>ccepts  complex </a:t>
+            </a:r>
+            <a:r>
+              <a:rPr lang="en-GB" dirty="0"/>
+              <a:t>R</a:t>
+            </a:r>
+            <a:r>
+              <a:rPr lang="en-GB" dirty="0" smtClean="0"/>
+              <a:t>ule Systems</a:t>
+            </a:r>
+            <a:endParaRPr lang="en-GB" dirty="0"/>
+          </a:p>
+          <a:p>
+            <a:endParaRPr lang="en-GB" dirty="0" smtClean="0"/>
+          </a:p>
+          <a:p>
+            <a:r>
+              <a:rPr lang="en-GB" dirty="0" smtClean="0"/>
+              <a:t>takes reasonable time to calculate large number of Observations</a:t>
+            </a:r>
+          </a:p>
+          <a:p>
+            <a:endParaRPr lang="en-GB" dirty="0"/>
+          </a:p>
+          <a:p>
+            <a:r>
+              <a:rPr lang="en-GB" dirty="0" smtClean="0"/>
+              <a:t> ?</a:t>
+            </a:r>
           </a:p>
         </p:txBody>
       </p:sp>
@@ -7916,11 +8373,7 @@
             </a:r>
             <a:r>
               <a:rPr lang="en-GB" dirty="0" smtClean="0"/>
-              <a:t>akes  lots of time to test and find a bug</a:t>
-            </a:r>
-            <a:r>
-              <a:rPr lang="en-GB" dirty="0" smtClean="0"/>
-              <a:t> </a:t>
+              <a:t>akes  lots of time to test and find a bug </a:t>
             </a:r>
             <a:endParaRPr lang="en-GB" dirty="0"/>
           </a:p>
@@ -8488,6 +8941,30 @@
           </a:p>
         </p:txBody>
       </p:sp>
+      <p:pic>
+        <p:nvPicPr>
+          <p:cNvPr id="4" name="Picture 3"/>
+          <p:cNvPicPr>
+            <a:picLocks noChangeAspect="1"/>
+          </p:cNvPicPr>
+          <p:nvPr/>
+        </p:nvPicPr>
+        <p:blipFill>
+          <a:blip r:embed="rId3"/>
+          <a:stretch>
+            <a:fillRect/>
+          </a:stretch>
+        </p:blipFill>
+        <p:spPr>
+          <a:xfrm>
+            <a:off x="836744" y="2733675"/>
+            <a:ext cx="9891127" cy="3040220"/>
+          </a:xfrm>
+          <a:prstGeom prst="rect">
+            <a:avLst/>
+          </a:prstGeom>
+        </p:spPr>
+      </p:pic>
     </p:spTree>
     <p:extLst>
       <p:ext uri="{BB962C8B-B14F-4D97-AF65-F5344CB8AC3E}">
@@ -8592,11 +9069,7 @@
             </a:r>
             <a:r>
               <a:rPr lang="en-GB" dirty="0" smtClean="0"/>
-              <a:t> </a:t>
-            </a:r>
-            <a:r>
-              <a:rPr lang="en-GB" dirty="0" smtClean="0"/>
-              <a:t>Always Open {</a:t>
+              <a:t> Always Open {</a:t>
             </a:r>
           </a:p>
           <a:p>
@@ -9015,7 +9488,7 @@
           <a:p>
             <a:r>
               <a:rPr lang="en-GB" dirty="0" smtClean="0"/>
-              <a:t>Problems</a:t>
+              <a:t>More complex example</a:t>
             </a:r>
             <a:endParaRPr lang="en-GB" dirty="0"/>
           </a:p>
@@ -9023,7 +9496,7 @@
       </p:sp>
       <p:sp>
         <p:nvSpPr>
-          <p:cNvPr id="3" name="Content Placeholder 2"/>
+          <p:cNvPr id="5" name="Content Placeholder 4"/>
           <p:cNvSpPr>
             <a:spLocks noGrp="1"/>
           </p:cNvSpPr>
@@ -9035,15 +9508,6 @@
         <p:txBody>
           <a:bodyPr/>
           <a:lstStyle/>
-          <a:p>
-            <a:r>
-              <a:rPr lang="en-GB" dirty="0" smtClean="0"/>
-              <a:t>Scalability </a:t>
-            </a:r>
-          </a:p>
-          <a:p>
-            <a:endParaRPr lang="en-GB" dirty="0"/>
-          </a:p>
           <a:p>
             <a:endParaRPr lang="en-GB" dirty="0"/>
           </a:p>
@@ -9052,7 +9516,7 @@
     </p:spTree>
     <p:extLst>
       <p:ext uri="{BB962C8B-B14F-4D97-AF65-F5344CB8AC3E}">
-        <p14:creationId xmlns:p14="http://schemas.microsoft.com/office/powerpoint/2010/main" val="430266955"/>
+        <p14:creationId xmlns:p14="http://schemas.microsoft.com/office/powerpoint/2010/main" val="1657566839"/>
       </p:ext>
     </p:extLst>
   </p:cSld>

</xml_diff>